<commit_message>
call, job 규격 Dev_Api -> Dev.Api 변경
</commit_message>
<xml_diff>
--- a/DsDotNet/src/UnitTest/UnitTest.Model/ImportOfficeExample/Sample/Sub/BodyShop.pptx
+++ b/DsDotNet/src/UnitTest/UnitTest.Model/ImportOfficeExample/Sample/Sub/BodyShop.pptx
@@ -217,7 +217,7 @@
           <a:p>
             <a:fld id="{DD503887-5801-43A0-AEF9-041E8DDC2558}" type="datetimeFigureOut">
               <a:rPr lang="ko-KR" altLang="en-US" smtClean="0"/>
-              <a:t>2024-05-30</a:t>
+              <a:t>2024-07-08</a:t>
             </a:fld>
             <a:endParaRPr lang="ko-KR" altLang="en-US"/>
           </a:p>
@@ -394,7 +394,7 @@
           <a:p>
             <a:fld id="{95336A0E-57B1-4D4C-BD9B-2F72B5943464}" type="datetimeFigureOut">
               <a:rPr lang="ko-KR" altLang="en-US" smtClean="0"/>
-              <a:t>2024-05-30</a:t>
+              <a:t>2024-07-08</a:t>
             </a:fld>
             <a:endParaRPr lang="ko-KR" altLang="en-US"/>
           </a:p>
@@ -3183,10 +3183,10 @@
       </p:pic>
       <p:grpSp>
         <p:nvGrpSpPr>
-          <p:cNvPr id="50" name="그룹 49">
-            <a:extLst>
-              <a:ext uri="{FF2B5EF4-FFF2-40B4-BE49-F238E27FC236}">
-                <a16:creationId xmlns:a16="http://schemas.microsoft.com/office/drawing/2014/main" id="{862603F7-8DE3-04CF-4E8F-A026EF4D3512}"/>
+          <p:cNvPr id="7" name="그룹 6">
+            <a:extLst>
+              <a:ext uri="{FF2B5EF4-FFF2-40B4-BE49-F238E27FC236}">
+                <a16:creationId xmlns:a16="http://schemas.microsoft.com/office/drawing/2014/main" id="{22568B11-B515-E709-E5F6-5897A803C47B}"/>
               </a:ext>
             </a:extLst>
           </p:cNvPr>
@@ -3727,10 +3727,10 @@
       </p:sp>
       <p:grpSp>
         <p:nvGrpSpPr>
-          <p:cNvPr id="49" name="그룹 48">
-            <a:extLst>
-              <a:ext uri="{FF2B5EF4-FFF2-40B4-BE49-F238E27FC236}">
-                <a16:creationId xmlns:a16="http://schemas.microsoft.com/office/drawing/2014/main" id="{65671349-0E99-922E-3DED-1099B0C3D220}"/>
+          <p:cNvPr id="6" name="그룹 5">
+            <a:extLst>
+              <a:ext uri="{FF2B5EF4-FFF2-40B4-BE49-F238E27FC236}">
+                <a16:creationId xmlns:a16="http://schemas.microsoft.com/office/drawing/2014/main" id="{1E8111DE-C4DB-180C-D931-9880BB790DBA}"/>
               </a:ext>
             </a:extLst>
           </p:cNvPr>
@@ -3917,10 +3917,10 @@
       </p:grpSp>
       <p:grpSp>
         <p:nvGrpSpPr>
-          <p:cNvPr id="48" name="그룹 47">
-            <a:extLst>
-              <a:ext uri="{FF2B5EF4-FFF2-40B4-BE49-F238E27FC236}">
-                <a16:creationId xmlns:a16="http://schemas.microsoft.com/office/drawing/2014/main" id="{2090C192-B684-59AD-6284-A114A9AABD3C}"/>
+          <p:cNvPr id="5" name="그룹 4">
+            <a:extLst>
+              <a:ext uri="{FF2B5EF4-FFF2-40B4-BE49-F238E27FC236}">
+                <a16:creationId xmlns:a16="http://schemas.microsoft.com/office/drawing/2014/main" id="{E821D2FE-90AF-1381-674C-13BCCEBFB2F8}"/>
               </a:ext>
             </a:extLst>
           </p:cNvPr>
@@ -4643,10 +4643,10 @@
       </p:cxnSp>
       <p:grpSp>
         <p:nvGrpSpPr>
-          <p:cNvPr id="47" name="그룹 46">
-            <a:extLst>
-              <a:ext uri="{FF2B5EF4-FFF2-40B4-BE49-F238E27FC236}">
-                <a16:creationId xmlns:a16="http://schemas.microsoft.com/office/drawing/2014/main" id="{02881B05-1DDF-B8E3-79AE-5057EC0CE919}"/>
+          <p:cNvPr id="3" name="그룹 2">
+            <a:extLst>
+              <a:ext uri="{FF2B5EF4-FFF2-40B4-BE49-F238E27FC236}">
+                <a16:creationId xmlns:a16="http://schemas.microsoft.com/office/drawing/2014/main" id="{1590A2C3-1E45-5408-F359-C24920EC41C3}"/>
               </a:ext>
             </a:extLst>
           </p:cNvPr>
@@ -5863,57 +5863,6 @@
           </a:fontRef>
         </p:style>
       </p:cxnSp>
-      <p:cxnSp>
-        <p:nvCxnSpPr>
-          <p:cNvPr id="29" name="연결선: 꺾임 28">
-            <a:extLst>
-              <a:ext uri="{FF2B5EF4-FFF2-40B4-BE49-F238E27FC236}">
-                <a16:creationId xmlns:a16="http://schemas.microsoft.com/office/drawing/2014/main" id="{0511AC68-A15F-20E0-0CF5-86865BAB8644}"/>
-              </a:ext>
-            </a:extLst>
-          </p:cNvPr>
-          <p:cNvCxnSpPr>
-            <a:cxnSpLocks/>
-            <a:stCxn id="51" idx="0"/>
-            <a:endCxn id="46" idx="2"/>
-          </p:cNvCxnSpPr>
-          <p:nvPr/>
-        </p:nvCxnSpPr>
-        <p:spPr>
-          <a:xfrm rot="5400000" flipH="1" flipV="1">
-            <a:off x="3896146" y="2947262"/>
-            <a:ext cx="3414230" cy="2829932"/>
-          </a:xfrm>
-          <a:prstGeom prst="bentConnector3">
-            <a:avLst>
-              <a:gd name="adj1" fmla="val 50000"/>
-            </a:avLst>
-          </a:prstGeom>
-          <a:ln w="28575" cap="flat" cmpd="sng" algn="ctr">
-            <a:solidFill>
-              <a:schemeClr val="accent2"/>
-            </a:solidFill>
-            <a:prstDash val="solid"/>
-            <a:round/>
-            <a:headEnd type="diamond" w="med" len="med"/>
-            <a:tailEnd type="triangle" w="med" len="med"/>
-          </a:ln>
-        </p:spPr>
-        <p:style>
-          <a:lnRef idx="0">
-            <a:scrgbClr r="0" g="0" b="0"/>
-          </a:lnRef>
-          <a:fillRef idx="0">
-            <a:scrgbClr r="0" g="0" b="0"/>
-          </a:fillRef>
-          <a:effectRef idx="0">
-            <a:scrgbClr r="0" g="0" b="0"/>
-          </a:effectRef>
-          <a:fontRef idx="minor">
-            <a:schemeClr val="tx1"/>
-          </a:fontRef>
-        </p:style>
-      </p:cxnSp>
       <p:sp>
         <p:nvSpPr>
           <p:cNvPr id="60" name="직사각형 59">
@@ -7244,6 +7193,183 @@
           </a:fontRef>
         </p:style>
       </p:cxnSp>
+      <p:cxnSp>
+        <p:nvCxnSpPr>
+          <p:cNvPr id="3" name="연결선: 꺾임 2">
+            <a:extLst>
+              <a:ext uri="{FF2B5EF4-FFF2-40B4-BE49-F238E27FC236}">
+                <a16:creationId xmlns:a16="http://schemas.microsoft.com/office/drawing/2014/main" id="{1E473859-FF8A-33F9-9810-BCAD5B56B83A}"/>
+              </a:ext>
+            </a:extLst>
+          </p:cNvPr>
+          <p:cNvCxnSpPr>
+            <a:cxnSpLocks/>
+            <a:stCxn id="51" idx="0"/>
+            <a:endCxn id="46" idx="2"/>
+          </p:cNvCxnSpPr>
+          <p:nvPr/>
+        </p:nvCxnSpPr>
+        <p:spPr>
+          <a:xfrm rot="5400000" flipH="1" flipV="1">
+            <a:off x="3896146" y="2947262"/>
+            <a:ext cx="3414230" cy="2829932"/>
+          </a:xfrm>
+          <a:prstGeom prst="bentConnector3">
+            <a:avLst>
+              <a:gd name="adj1" fmla="val 50000"/>
+            </a:avLst>
+          </a:prstGeom>
+          <a:ln w="25400">
+            <a:prstDash val="solid"/>
+            <a:headEnd w="lg" len="lg"/>
+            <a:tailEnd type="triangle" w="lg" len="lg"/>
+          </a:ln>
+        </p:spPr>
+        <p:style>
+          <a:lnRef idx="1">
+            <a:schemeClr val="accent1"/>
+          </a:lnRef>
+          <a:fillRef idx="0">
+            <a:schemeClr val="accent1"/>
+          </a:fillRef>
+          <a:effectRef idx="0">
+            <a:schemeClr val="accent1"/>
+          </a:effectRef>
+          <a:fontRef idx="minor">
+            <a:schemeClr val="tx1"/>
+          </a:fontRef>
+        </p:style>
+      </p:cxnSp>
+      <p:sp>
+        <p:nvSpPr>
+          <p:cNvPr id="6" name="사각형: 모서리가 접힌 도형 5">
+            <a:extLst>
+              <a:ext uri="{FF2B5EF4-FFF2-40B4-BE49-F238E27FC236}">
+                <a16:creationId xmlns:a16="http://schemas.microsoft.com/office/drawing/2014/main" id="{289BD39F-1B25-DC9B-9F1F-0F618977C435}"/>
+              </a:ext>
+            </a:extLst>
+          </p:cNvPr>
+          <p:cNvSpPr/>
+          <p:nvPr/>
+        </p:nvSpPr>
+        <p:spPr>
+          <a:xfrm>
+            <a:off x="8425898" y="354903"/>
+            <a:ext cx="1685035" cy="591039"/>
+          </a:xfrm>
+          <a:prstGeom prst="foldedCorner">
+            <a:avLst>
+              <a:gd name="adj" fmla="val 27487"/>
+            </a:avLst>
+          </a:prstGeom>
+          <a:solidFill>
+            <a:schemeClr val="accent3">
+              <a:alpha val="50000"/>
+            </a:schemeClr>
+          </a:solidFill>
+          <a:ln>
+            <a:noFill/>
+          </a:ln>
+        </p:spPr>
+        <p:style>
+          <a:lnRef idx="0">
+            <a:scrgbClr r="0" g="0" b="0"/>
+          </a:lnRef>
+          <a:fillRef idx="0">
+            <a:scrgbClr r="0" g="0" b="0"/>
+          </a:fillRef>
+          <a:effectRef idx="0">
+            <a:scrgbClr r="0" g="0" b="0"/>
+          </a:effectRef>
+          <a:fontRef idx="minor">
+            <a:schemeClr val="lt1"/>
+          </a:fontRef>
+        </p:style>
+        <p:txBody>
+          <a:bodyPr rtlCol="0" anchor="ctr"/>
+          <a:lstStyle/>
+          <a:p>
+            <a:pPr algn="ctr"/>
+            <a:r>
+              <a:rPr lang="en-US" altLang="ko-KR" sz="900" dirty="0"/>
+              <a:t>./Sub/Sub/LH</a:t>
+            </a:r>
+          </a:p>
+          <a:p>
+            <a:pPr algn="ctr"/>
+            <a:r>
+              <a:rPr lang="en-US" altLang="ko-KR" sz="900" dirty="0"/>
+              <a:t>[LH]</a:t>
+            </a:r>
+            <a:endParaRPr lang="ko-KR" altLang="en-US" sz="900" dirty="0"/>
+          </a:p>
+        </p:txBody>
+      </p:sp>
+      <p:sp>
+        <p:nvSpPr>
+          <p:cNvPr id="10" name="사각형: 모서리가 접힌 도형 9">
+            <a:extLst>
+              <a:ext uri="{FF2B5EF4-FFF2-40B4-BE49-F238E27FC236}">
+                <a16:creationId xmlns:a16="http://schemas.microsoft.com/office/drawing/2014/main" id="{3016DACB-9738-0B1A-D47B-FBB44C254922}"/>
+              </a:ext>
+            </a:extLst>
+          </p:cNvPr>
+          <p:cNvSpPr/>
+          <p:nvPr/>
+        </p:nvSpPr>
+        <p:spPr>
+          <a:xfrm>
+            <a:off x="10216968" y="354903"/>
+            <a:ext cx="1685035" cy="591039"/>
+          </a:xfrm>
+          <a:prstGeom prst="foldedCorner">
+            <a:avLst>
+              <a:gd name="adj" fmla="val 27487"/>
+            </a:avLst>
+          </a:prstGeom>
+          <a:solidFill>
+            <a:schemeClr val="accent3">
+              <a:alpha val="50000"/>
+            </a:schemeClr>
+          </a:solidFill>
+          <a:ln>
+            <a:noFill/>
+          </a:ln>
+        </p:spPr>
+        <p:style>
+          <a:lnRef idx="0">
+            <a:scrgbClr r="0" g="0" b="0"/>
+          </a:lnRef>
+          <a:fillRef idx="0">
+            <a:scrgbClr r="0" g="0" b="0"/>
+          </a:fillRef>
+          <a:effectRef idx="0">
+            <a:scrgbClr r="0" g="0" b="0"/>
+          </a:effectRef>
+          <a:fontRef idx="minor">
+            <a:schemeClr val="lt1"/>
+          </a:fontRef>
+        </p:style>
+        <p:txBody>
+          <a:bodyPr rtlCol="0" anchor="ctr"/>
+          <a:lstStyle/>
+          <a:p>
+            <a:pPr algn="ctr"/>
+            <a:r>
+              <a:rPr lang="en-US" altLang="ko-KR" sz="900" dirty="0"/>
+              <a:t>./Sub/Sub/RH</a:t>
+            </a:r>
+          </a:p>
+          <a:p>
+            <a:pPr algn="ctr"/>
+            <a:r>
+              <a:rPr lang="en-US" altLang="ko-KR" sz="900" dirty="0"/>
+              <a:t>[RH]</a:t>
+            </a:r>
+            <a:endParaRPr lang="ko-KR" altLang="en-US" sz="900" dirty="0"/>
+          </a:p>
+        </p:txBody>
+      </p:sp>
     </p:spTree>
     <p:extLst>
       <p:ext uri="{BB962C8B-B14F-4D97-AF65-F5344CB8AC3E}">

</xml_diff>